<commit_message>
final friday night update to ppt
</commit_message>
<xml_diff>
--- a/UNABLE LARKS! – PREDICTING TENNIS.pptx
+++ b/UNABLE LARKS! – PREDICTING TENNIS.pptx
@@ -8,7 +8,17 @@
     <p:sldId id="256" r:id="rId2"/>
     <p:sldId id="257" r:id="rId3"/>
     <p:sldId id="258" r:id="rId4"/>
-    <p:sldId id="259" r:id="rId5"/>
+    <p:sldId id="261" r:id="rId5"/>
+    <p:sldId id="259" r:id="rId6"/>
+    <p:sldId id="263" r:id="rId7"/>
+    <p:sldId id="260" r:id="rId8"/>
+    <p:sldId id="264" r:id="rId9"/>
+    <p:sldId id="265" r:id="rId10"/>
+    <p:sldId id="266" r:id="rId11"/>
+    <p:sldId id="267" r:id="rId12"/>
+    <p:sldId id="262" r:id="rId13"/>
+    <p:sldId id="268" r:id="rId14"/>
+    <p:sldId id="269" r:id="rId15"/>
   </p:sldIdLst>
   <p:sldSz cx="12192000" cy="6858000"/>
   <p:notesSz cx="6858000" cy="9144000"/>
@@ -210,7 +220,7 @@
           <a:effectLst/>
           <a:extLst>
             <a:ext uri="{91240B29-F687-4f45-9708-019B960494DF}">
-              <a14:hiddenLine xmlns="" xmlns:a14="http://schemas.microsoft.com/office/drawing/2010/main" w="9525">
+              <a14:hiddenLine xmlns:a14="http://schemas.microsoft.com/office/drawing/2010/main" xmlns="" w="9525">
                 <a:solidFill>
                   <a:srgbClr val="000000"/>
                 </a:solidFill>
@@ -1720,7 +1730,7 @@
           <a:ln/>
           <a:extLst>
             <a:ext uri="{91240B29-F687-4f45-9708-019B960494DF}">
-              <a14:hiddenLine xmlns="" xmlns:a14="http://schemas.microsoft.com/office/drawing/2010/main" w="9525">
+              <a14:hiddenLine xmlns:a14="http://schemas.microsoft.com/office/drawing/2010/main" xmlns="" w="9525">
                 <a:solidFill>
                   <a:srgbClr val="000000"/>
                 </a:solidFill>
@@ -1992,7 +2002,7 @@
           <a:ln/>
           <a:extLst>
             <a:ext uri="{91240B29-F687-4f45-9708-019B960494DF}">
-              <a14:hiddenLine xmlns="" xmlns:a14="http://schemas.microsoft.com/office/drawing/2010/main" w="9525">
+              <a14:hiddenLine xmlns:a14="http://schemas.microsoft.com/office/drawing/2010/main" xmlns="" w="9525">
                 <a:solidFill>
                   <a:srgbClr val="000000"/>
                 </a:solidFill>
@@ -2272,7 +2282,7 @@
           <a:ln/>
           <a:extLst>
             <a:ext uri="{91240B29-F687-4f45-9708-019B960494DF}">
-              <a14:hiddenLine xmlns="" xmlns:a14="http://schemas.microsoft.com/office/drawing/2010/main" w="9525">
+              <a14:hiddenLine xmlns:a14="http://schemas.microsoft.com/office/drawing/2010/main" xmlns="" w="9525">
                 <a:solidFill>
                   <a:srgbClr val="000000"/>
                 </a:solidFill>
@@ -2892,7 +2902,7 @@
           <a:ln/>
           <a:extLst>
             <a:ext uri="{91240B29-F687-4f45-9708-019B960494DF}">
-              <a14:hiddenLine xmlns="" xmlns:a14="http://schemas.microsoft.com/office/drawing/2010/main" w="9525">
+              <a14:hiddenLine xmlns:a14="http://schemas.microsoft.com/office/drawing/2010/main" xmlns="" w="9525">
                 <a:solidFill>
                   <a:srgbClr val="000000"/>
                 </a:solidFill>
@@ -3228,7 +3238,7 @@
           <a:ln/>
           <a:extLst>
             <a:ext uri="{91240B29-F687-4f45-9708-019B960494DF}">
-              <a14:hiddenLine xmlns="" xmlns:a14="http://schemas.microsoft.com/office/drawing/2010/main" w="9525">
+              <a14:hiddenLine xmlns:a14="http://schemas.microsoft.com/office/drawing/2010/main" xmlns="" w="9525">
                 <a:solidFill>
                   <a:srgbClr val="000000"/>
                 </a:solidFill>
@@ -3702,7 +3712,7 @@
           <a:ln/>
           <a:extLst>
             <a:ext uri="{91240B29-F687-4f45-9708-019B960494DF}">
-              <a14:hiddenLine xmlns="" xmlns:a14="http://schemas.microsoft.com/office/drawing/2010/main" w="9525">
+              <a14:hiddenLine xmlns:a14="http://schemas.microsoft.com/office/drawing/2010/main" xmlns="" w="9525">
                 <a:solidFill>
                   <a:srgbClr val="000000"/>
                 </a:solidFill>
@@ -4125,7 +4135,7 @@
           <a:ln/>
           <a:extLst>
             <a:ext uri="{91240B29-F687-4f45-9708-019B960494DF}">
-              <a14:hiddenLine xmlns="" xmlns:a14="http://schemas.microsoft.com/office/drawing/2010/main" w="9525">
+              <a14:hiddenLine xmlns:a14="http://schemas.microsoft.com/office/drawing/2010/main" xmlns="" w="9525">
                 <a:solidFill>
                   <a:srgbClr val="000000"/>
                 </a:solidFill>
@@ -5421,6 +5431,794 @@
 </p:sld>
 </file>
 
+<file path=ppt/slides/slide10.xml><?xml version="1.0" encoding="utf-8"?>
+<p:sld xmlns:a="http://schemas.openxmlformats.org/drawingml/2006/main" xmlns:r="http://schemas.openxmlformats.org/officeDocument/2006/relationships" xmlns:p="http://schemas.openxmlformats.org/presentationml/2006/main">
+  <p:cSld>
+    <p:spTree>
+      <p:nvGrpSpPr>
+        <p:cNvPr id="1" name=""/>
+        <p:cNvGrpSpPr/>
+        <p:nvPr/>
+      </p:nvGrpSpPr>
+      <p:grpSpPr>
+        <a:xfrm>
+          <a:off x="0" y="0"/>
+          <a:ext cx="0" cy="0"/>
+          <a:chOff x="0" y="0"/>
+          <a:chExt cx="0" cy="0"/>
+        </a:xfrm>
+      </p:grpSpPr>
+      <p:sp>
+        <p:nvSpPr>
+          <p:cNvPr id="2" name="Title 1">
+            <a:extLst>
+              <a:ext uri="{FF2B5EF4-FFF2-40B4-BE49-F238E27FC236}">
+                <a16:creationId xmlns:a16="http://schemas.microsoft.com/office/drawing/2014/main" id="{109CCB09-BB9D-4135-A2AC-B00A439D4B4B}"/>
+              </a:ext>
+            </a:extLst>
+          </p:cNvPr>
+          <p:cNvSpPr>
+            <a:spLocks noGrp="1"/>
+          </p:cNvSpPr>
+          <p:nvPr>
+            <p:ph type="title"/>
+          </p:nvPr>
+        </p:nvSpPr>
+        <p:spPr/>
+        <p:txBody>
+          <a:bodyPr/>
+          <a:lstStyle/>
+          <a:p>
+            <a:pPr algn="ctr"/>
+            <a:r>
+              <a:rPr lang="en-US" dirty="0"/>
+              <a:t>CREATE DATAFRAME FOR ALL WINNER STATS</a:t>
+            </a:r>
+          </a:p>
+        </p:txBody>
+      </p:sp>
+      <p:pic>
+        <p:nvPicPr>
+          <p:cNvPr id="4" name="Content Placeholder 3">
+            <a:extLst>
+              <a:ext uri="{FF2B5EF4-FFF2-40B4-BE49-F238E27FC236}">
+                <a16:creationId xmlns:a16="http://schemas.microsoft.com/office/drawing/2014/main" id="{355EBB0B-94A1-4793-B3FF-AA4ED98D2AA2}"/>
+              </a:ext>
+            </a:extLst>
+          </p:cNvPr>
+          <p:cNvPicPr>
+            <a:picLocks noGrp="1" noChangeAspect="1"/>
+          </p:cNvPicPr>
+          <p:nvPr>
+            <p:ph idx="1"/>
+          </p:nvPr>
+        </p:nvPicPr>
+        <p:blipFill>
+          <a:blip r:embed="rId2"/>
+          <a:stretch>
+            <a:fillRect/>
+          </a:stretch>
+        </p:blipFill>
+        <p:spPr>
+          <a:xfrm>
+            <a:off x="0" y="2340865"/>
+            <a:ext cx="12192000" cy="4352544"/>
+          </a:xfrm>
+          <a:prstGeom prst="rect">
+            <a:avLst/>
+          </a:prstGeom>
+        </p:spPr>
+      </p:pic>
+    </p:spTree>
+    <p:extLst>
+      <p:ext uri="{BB962C8B-B14F-4D97-AF65-F5344CB8AC3E}">
+        <p14:creationId xmlns:p14="http://schemas.microsoft.com/office/powerpoint/2010/main" val="222343130"/>
+      </p:ext>
+    </p:extLst>
+  </p:cSld>
+  <p:clrMapOvr>
+    <a:masterClrMapping/>
+  </p:clrMapOvr>
+</p:sld>
+</file>
+
+<file path=ppt/slides/slide11.xml><?xml version="1.0" encoding="utf-8"?>
+<p:sld xmlns:a="http://schemas.openxmlformats.org/drawingml/2006/main" xmlns:r="http://schemas.openxmlformats.org/officeDocument/2006/relationships" xmlns:p="http://schemas.openxmlformats.org/presentationml/2006/main">
+  <p:cSld>
+    <p:spTree>
+      <p:nvGrpSpPr>
+        <p:cNvPr id="1" name=""/>
+        <p:cNvGrpSpPr/>
+        <p:nvPr/>
+      </p:nvGrpSpPr>
+      <p:grpSpPr>
+        <a:xfrm>
+          <a:off x="0" y="0"/>
+          <a:ext cx="0" cy="0"/>
+          <a:chOff x="0" y="0"/>
+          <a:chExt cx="0" cy="0"/>
+        </a:xfrm>
+      </p:grpSpPr>
+      <p:sp>
+        <p:nvSpPr>
+          <p:cNvPr id="2" name="Title 1">
+            <a:extLst>
+              <a:ext uri="{FF2B5EF4-FFF2-40B4-BE49-F238E27FC236}">
+                <a16:creationId xmlns:a16="http://schemas.microsoft.com/office/drawing/2014/main" id="{64A81482-716F-4F9A-838D-375E984BAF81}"/>
+              </a:ext>
+            </a:extLst>
+          </p:cNvPr>
+          <p:cNvSpPr>
+            <a:spLocks noGrp="1"/>
+          </p:cNvSpPr>
+          <p:nvPr>
+            <p:ph type="title"/>
+          </p:nvPr>
+        </p:nvSpPr>
+        <p:spPr/>
+        <p:txBody>
+          <a:bodyPr/>
+          <a:lstStyle/>
+          <a:p>
+            <a:pPr algn="ctr"/>
+            <a:r>
+              <a:rPr lang="en-US" dirty="0"/>
+              <a:t>CREATE TOTAL DATAFRAME FOR ALL PLAYERS</a:t>
+            </a:r>
+          </a:p>
+        </p:txBody>
+      </p:sp>
+      <p:pic>
+        <p:nvPicPr>
+          <p:cNvPr id="4" name="Content Placeholder 3">
+            <a:extLst>
+              <a:ext uri="{FF2B5EF4-FFF2-40B4-BE49-F238E27FC236}">
+                <a16:creationId xmlns:a16="http://schemas.microsoft.com/office/drawing/2014/main" id="{E051295D-04BE-48E2-8316-DDBA2CFFB0C8}"/>
+              </a:ext>
+            </a:extLst>
+          </p:cNvPr>
+          <p:cNvPicPr>
+            <a:picLocks noGrp="1" noChangeAspect="1"/>
+          </p:cNvPicPr>
+          <p:nvPr>
+            <p:ph idx="1"/>
+          </p:nvPr>
+        </p:nvPicPr>
+        <p:blipFill>
+          <a:blip r:embed="rId2"/>
+          <a:stretch>
+            <a:fillRect/>
+          </a:stretch>
+        </p:blipFill>
+        <p:spPr>
+          <a:xfrm>
+            <a:off x="0" y="2304288"/>
+            <a:ext cx="12192000" cy="4407408"/>
+          </a:xfrm>
+          <a:prstGeom prst="rect">
+            <a:avLst/>
+          </a:prstGeom>
+        </p:spPr>
+      </p:pic>
+    </p:spTree>
+    <p:extLst>
+      <p:ext uri="{BB962C8B-B14F-4D97-AF65-F5344CB8AC3E}">
+        <p14:creationId xmlns:p14="http://schemas.microsoft.com/office/powerpoint/2010/main" val="2976690479"/>
+      </p:ext>
+    </p:extLst>
+  </p:cSld>
+  <p:clrMapOvr>
+    <a:masterClrMapping/>
+  </p:clrMapOvr>
+</p:sld>
+</file>
+
+<file path=ppt/slides/slide12.xml><?xml version="1.0" encoding="utf-8"?>
+<p:sld xmlns:a="http://schemas.openxmlformats.org/drawingml/2006/main" xmlns:r="http://schemas.openxmlformats.org/officeDocument/2006/relationships" xmlns:p="http://schemas.openxmlformats.org/presentationml/2006/main">
+  <p:cSld>
+    <p:spTree>
+      <p:nvGrpSpPr>
+        <p:cNvPr id="1" name=""/>
+        <p:cNvGrpSpPr/>
+        <p:nvPr/>
+      </p:nvGrpSpPr>
+      <p:grpSpPr>
+        <a:xfrm>
+          <a:off x="0" y="0"/>
+          <a:ext cx="0" cy="0"/>
+          <a:chOff x="0" y="0"/>
+          <a:chExt cx="0" cy="0"/>
+        </a:xfrm>
+      </p:grpSpPr>
+      <p:sp>
+        <p:nvSpPr>
+          <p:cNvPr id="2" name="Title 1">
+            <a:extLst>
+              <a:ext uri="{FF2B5EF4-FFF2-40B4-BE49-F238E27FC236}">
+                <a16:creationId xmlns:a16="http://schemas.microsoft.com/office/drawing/2014/main" id="{73BA5E60-FC57-4285-AE11-34F12CADF376}"/>
+              </a:ext>
+            </a:extLst>
+          </p:cNvPr>
+          <p:cNvSpPr>
+            <a:spLocks noGrp="1"/>
+          </p:cNvSpPr>
+          <p:nvPr>
+            <p:ph type="title"/>
+          </p:nvPr>
+        </p:nvSpPr>
+        <p:spPr/>
+        <p:txBody>
+          <a:bodyPr/>
+          <a:lstStyle/>
+          <a:p>
+            <a:pPr algn="ctr"/>
+            <a:r>
+              <a:rPr lang="en-US" dirty="0"/>
+              <a:t>STATISTICS WE CALCULATED FOR ADDITIONAL FEATURES</a:t>
+            </a:r>
+          </a:p>
+        </p:txBody>
+      </p:sp>
+      <p:sp>
+        <p:nvSpPr>
+          <p:cNvPr id="3" name="Content Placeholder 2">
+            <a:extLst>
+              <a:ext uri="{FF2B5EF4-FFF2-40B4-BE49-F238E27FC236}">
+                <a16:creationId xmlns:a16="http://schemas.microsoft.com/office/drawing/2014/main" id="{86A2F094-A04B-4953-BC30-FFFB280DB2E2}"/>
+              </a:ext>
+            </a:extLst>
+          </p:cNvPr>
+          <p:cNvSpPr>
+            <a:spLocks noGrp="1"/>
+          </p:cNvSpPr>
+          <p:nvPr>
+            <p:ph idx="1"/>
+          </p:nvPr>
+        </p:nvSpPr>
+        <p:spPr/>
+        <p:txBody>
+          <a:bodyPr>
+            <a:normAutofit/>
+          </a:bodyPr>
+          <a:lstStyle/>
+          <a:p>
+            <a:r>
+              <a:rPr lang="en-US" sz="2400" b="1" dirty="0"/>
+              <a:t>( **** LIST SOME OF THE STATS WE CALCULATED TO YIELD ADDITIONAL FEATURES FOR OUR MODEL***)   excel screenshot, </a:t>
+            </a:r>
+            <a:r>
+              <a:rPr lang="en-US" sz="2400" b="1" dirty="0" err="1"/>
+              <a:t>etc</a:t>
+            </a:r>
+            <a:endParaRPr lang="en-US" sz="2400" b="1" dirty="0"/>
+          </a:p>
+        </p:txBody>
+      </p:sp>
+    </p:spTree>
+    <p:extLst>
+      <p:ext uri="{BB962C8B-B14F-4D97-AF65-F5344CB8AC3E}">
+        <p14:creationId xmlns:p14="http://schemas.microsoft.com/office/powerpoint/2010/main" val="436315280"/>
+      </p:ext>
+    </p:extLst>
+  </p:cSld>
+  <p:clrMapOvr>
+    <a:masterClrMapping/>
+  </p:clrMapOvr>
+</p:sld>
+</file>
+
+<file path=ppt/slides/slide13.xml><?xml version="1.0" encoding="utf-8"?>
+<p:sld xmlns:a="http://schemas.openxmlformats.org/drawingml/2006/main" xmlns:r="http://schemas.openxmlformats.org/officeDocument/2006/relationships" xmlns:p="http://schemas.openxmlformats.org/presentationml/2006/main">
+  <p:cSld>
+    <p:spTree>
+      <p:nvGrpSpPr>
+        <p:cNvPr id="1" name=""/>
+        <p:cNvGrpSpPr/>
+        <p:nvPr/>
+      </p:nvGrpSpPr>
+      <p:grpSpPr>
+        <a:xfrm>
+          <a:off x="0" y="0"/>
+          <a:ext cx="0" cy="0"/>
+          <a:chOff x="0" y="0"/>
+          <a:chExt cx="0" cy="0"/>
+        </a:xfrm>
+      </p:grpSpPr>
+      <p:sp>
+        <p:nvSpPr>
+          <p:cNvPr id="2" name="Title 1">
+            <a:extLst>
+              <a:ext uri="{FF2B5EF4-FFF2-40B4-BE49-F238E27FC236}">
+                <a16:creationId xmlns:a16="http://schemas.microsoft.com/office/drawing/2014/main" id="{A9875BE5-EA5F-4C43-8FC8-3EFEAA079D28}"/>
+              </a:ext>
+            </a:extLst>
+          </p:cNvPr>
+          <p:cNvSpPr>
+            <a:spLocks noGrp="1"/>
+          </p:cNvSpPr>
+          <p:nvPr>
+            <p:ph type="title"/>
+          </p:nvPr>
+        </p:nvSpPr>
+        <p:spPr/>
+        <p:txBody>
+          <a:bodyPr/>
+          <a:lstStyle/>
+          <a:p>
+            <a:pPr algn="ctr"/>
+            <a:r>
+              <a:rPr lang="en-US" dirty="0"/>
+              <a:t>CREATED PERCENTAGES FOR THE PLAYER’S STATS</a:t>
+            </a:r>
+          </a:p>
+        </p:txBody>
+      </p:sp>
+      <p:sp>
+        <p:nvSpPr>
+          <p:cNvPr id="3" name="Content Placeholder 2">
+            <a:extLst>
+              <a:ext uri="{FF2B5EF4-FFF2-40B4-BE49-F238E27FC236}">
+                <a16:creationId xmlns:a16="http://schemas.microsoft.com/office/drawing/2014/main" id="{79603863-7F0A-48FC-8230-C4CD1ACFDB86}"/>
+              </a:ext>
+            </a:extLst>
+          </p:cNvPr>
+          <p:cNvSpPr>
+            <a:spLocks noGrp="1"/>
+          </p:cNvSpPr>
+          <p:nvPr>
+            <p:ph idx="1"/>
+          </p:nvPr>
+        </p:nvSpPr>
+        <p:spPr/>
+        <p:txBody>
+          <a:bodyPr/>
+          <a:lstStyle/>
+          <a:p>
+            <a:r>
+              <a:rPr lang="en-US" dirty="0" err="1"/>
+              <a:t>total_player_stats</a:t>
+            </a:r>
+            <a:r>
+              <a:rPr lang="en-US" dirty="0"/>
+              <a:t>["</a:t>
+            </a:r>
+            <a:r>
+              <a:rPr lang="en-US" dirty="0" err="1"/>
+              <a:t>ace_pct</a:t>
+            </a:r>
+            <a:r>
+              <a:rPr lang="en-US" dirty="0"/>
+              <a:t>"] = </a:t>
+            </a:r>
+            <a:r>
+              <a:rPr lang="en-US" dirty="0" err="1"/>
+              <a:t>total_player_stats</a:t>
+            </a:r>
+            <a:r>
+              <a:rPr lang="en-US" dirty="0"/>
+              <a:t>["aces"]/</a:t>
+            </a:r>
+            <a:r>
+              <a:rPr lang="en-US" dirty="0" err="1"/>
+              <a:t>total_player_stats</a:t>
+            </a:r>
+            <a:r>
+              <a:rPr lang="en-US" dirty="0"/>
+              <a:t>["</a:t>
+            </a:r>
+            <a:r>
+              <a:rPr lang="en-US" dirty="0" err="1"/>
+              <a:t>svpt_total</a:t>
+            </a:r>
+            <a:r>
+              <a:rPr lang="en-US" dirty="0"/>
+              <a:t>"]</a:t>
+            </a:r>
+          </a:p>
+          <a:p>
+            <a:r>
+              <a:rPr lang="en-US" dirty="0" err="1"/>
+              <a:t>total_player_stats</a:t>
+            </a:r>
+            <a:r>
+              <a:rPr lang="en-US" dirty="0"/>
+              <a:t>["</a:t>
+            </a:r>
+            <a:r>
+              <a:rPr lang="en-US" dirty="0" err="1"/>
+              <a:t>df_pct</a:t>
+            </a:r>
+            <a:r>
+              <a:rPr lang="en-US" dirty="0"/>
+              <a:t>"] = </a:t>
+            </a:r>
+            <a:r>
+              <a:rPr lang="en-US" dirty="0" err="1"/>
+              <a:t>total_player_stats</a:t>
+            </a:r>
+            <a:r>
+              <a:rPr lang="en-US" dirty="0"/>
+              <a:t>["</a:t>
+            </a:r>
+            <a:r>
+              <a:rPr lang="en-US" dirty="0" err="1"/>
+              <a:t>doubfts</a:t>
+            </a:r>
+            <a:r>
+              <a:rPr lang="en-US" dirty="0"/>
+              <a:t>"]/</a:t>
+            </a:r>
+            <a:r>
+              <a:rPr lang="en-US" dirty="0" err="1"/>
+              <a:t>total_player_stats</a:t>
+            </a:r>
+            <a:r>
+              <a:rPr lang="en-US" dirty="0"/>
+              <a:t>["</a:t>
+            </a:r>
+            <a:r>
+              <a:rPr lang="en-US" dirty="0" err="1"/>
+              <a:t>svpt_total</a:t>
+            </a:r>
+            <a:r>
+              <a:rPr lang="en-US" dirty="0"/>
+              <a:t>"]</a:t>
+            </a:r>
+          </a:p>
+          <a:p>
+            <a:r>
+              <a:rPr lang="en-US" dirty="0" err="1"/>
+              <a:t>total_player_stats</a:t>
+            </a:r>
+            <a:r>
+              <a:rPr lang="en-US" dirty="0"/>
+              <a:t>["</a:t>
+            </a:r>
+            <a:r>
+              <a:rPr lang="en-US" dirty="0" err="1"/>
+              <a:t>first_serve_won_pct</a:t>
+            </a:r>
+            <a:r>
+              <a:rPr lang="en-US" dirty="0"/>
+              <a:t>"] = </a:t>
+            </a:r>
+            <a:r>
+              <a:rPr lang="en-US" dirty="0" err="1"/>
+              <a:t>total_player_stats</a:t>
+            </a:r>
+            <a:r>
+              <a:rPr lang="en-US" dirty="0"/>
+              <a:t>["</a:t>
+            </a:r>
+            <a:r>
+              <a:rPr lang="en-US" dirty="0" err="1"/>
+              <a:t>first_serves_won</a:t>
+            </a:r>
+            <a:r>
+              <a:rPr lang="en-US" dirty="0"/>
+              <a:t>"]/</a:t>
+            </a:r>
+            <a:r>
+              <a:rPr lang="en-US" dirty="0" err="1"/>
+              <a:t>total_player_stats</a:t>
+            </a:r>
+            <a:r>
+              <a:rPr lang="en-US" dirty="0"/>
+              <a:t>["</a:t>
+            </a:r>
+            <a:r>
+              <a:rPr lang="en-US" dirty="0" err="1"/>
+              <a:t>first_serve_in</a:t>
+            </a:r>
+            <a:r>
+              <a:rPr lang="en-US" dirty="0"/>
+              <a:t>"]</a:t>
+            </a:r>
+          </a:p>
+          <a:p>
+            <a:r>
+              <a:rPr lang="en-US" dirty="0" err="1"/>
+              <a:t>total_player_stats</a:t>
+            </a:r>
+            <a:r>
+              <a:rPr lang="en-US" dirty="0"/>
+              <a:t>["</a:t>
+            </a:r>
+            <a:r>
+              <a:rPr lang="en-US" dirty="0" err="1"/>
+              <a:t>broken_pct</a:t>
+            </a:r>
+            <a:r>
+              <a:rPr lang="en-US" dirty="0"/>
+              <a:t>"] = (</a:t>
+            </a:r>
+            <a:r>
+              <a:rPr lang="en-US" dirty="0" err="1"/>
+              <a:t>total_player_stats</a:t>
+            </a:r>
+            <a:r>
+              <a:rPr lang="en-US" dirty="0"/>
+              <a:t>["</a:t>
+            </a:r>
+            <a:r>
+              <a:rPr lang="en-US" dirty="0" err="1"/>
+              <a:t>total_brk_faced</a:t>
+            </a:r>
+            <a:r>
+              <a:rPr lang="en-US" dirty="0"/>
+              <a:t>"]-</a:t>
+            </a:r>
+            <a:r>
+              <a:rPr lang="en-US" dirty="0" err="1"/>
+              <a:t>total_player_stats</a:t>
+            </a:r>
+            <a:r>
+              <a:rPr lang="en-US" dirty="0"/>
+              <a:t>["</a:t>
+            </a:r>
+            <a:r>
+              <a:rPr lang="en-US" dirty="0" err="1"/>
+              <a:t>total_brk_saved</a:t>
+            </a:r>
+            <a:r>
+              <a:rPr lang="en-US" dirty="0"/>
+              <a:t>"])/</a:t>
+            </a:r>
+            <a:r>
+              <a:rPr lang="en-US" dirty="0" err="1"/>
+              <a:t>total_player_stats</a:t>
+            </a:r>
+            <a:r>
+              <a:rPr lang="en-US" dirty="0"/>
+              <a:t>["</a:t>
+            </a:r>
+            <a:r>
+              <a:rPr lang="en-US" dirty="0" err="1"/>
+              <a:t>service_games</a:t>
+            </a:r>
+            <a:r>
+              <a:rPr lang="en-US" dirty="0"/>
+              <a:t>"]</a:t>
+            </a:r>
+          </a:p>
+          <a:p>
+            <a:r>
+              <a:rPr lang="en-US" dirty="0" err="1"/>
+              <a:t>total_player_stats</a:t>
+            </a:r>
+            <a:r>
+              <a:rPr lang="en-US" dirty="0"/>
+              <a:t>["</a:t>
+            </a:r>
+            <a:r>
+              <a:rPr lang="en-US" dirty="0" err="1"/>
+              <a:t>breaking_pct</a:t>
+            </a:r>
+            <a:r>
+              <a:rPr lang="en-US" dirty="0"/>
+              <a:t>"] = (</a:t>
+            </a:r>
+            <a:r>
+              <a:rPr lang="en-US" dirty="0" err="1"/>
+              <a:t>total_player_stats</a:t>
+            </a:r>
+            <a:r>
+              <a:rPr lang="en-US" dirty="0"/>
+              <a:t>["</a:t>
+            </a:r>
+            <a:r>
+              <a:rPr lang="en-US" dirty="0" err="1"/>
+              <a:t>break_point_opp_total</a:t>
+            </a:r>
+            <a:r>
+              <a:rPr lang="en-US" dirty="0"/>
+              <a:t>"]-</a:t>
+            </a:r>
+            <a:r>
+              <a:rPr lang="en-US" dirty="0" err="1"/>
+              <a:t>total_player_stats</a:t>
+            </a:r>
+            <a:r>
+              <a:rPr lang="en-US" dirty="0"/>
+              <a:t>["</a:t>
+            </a:r>
+            <a:r>
+              <a:rPr lang="en-US" dirty="0" err="1"/>
+              <a:t>break_point_opp_loss</a:t>
+            </a:r>
+            <a:r>
+              <a:rPr lang="en-US" dirty="0"/>
+              <a:t>"])/</a:t>
+            </a:r>
+            <a:r>
+              <a:rPr lang="en-US" dirty="0" err="1"/>
+              <a:t>total_player_stats</a:t>
+            </a:r>
+            <a:r>
+              <a:rPr lang="en-US" dirty="0"/>
+              <a:t>["</a:t>
+            </a:r>
+            <a:r>
+              <a:rPr lang="en-US" dirty="0" err="1"/>
+              <a:t>rt_games_total</a:t>
+            </a:r>
+            <a:r>
+              <a:rPr lang="en-US" dirty="0"/>
+              <a:t>"]</a:t>
+            </a:r>
+          </a:p>
+          <a:p>
+            <a:r>
+              <a:rPr lang="en-US" dirty="0" err="1"/>
+              <a:t>total_player_stats</a:t>
+            </a:r>
+            <a:r>
+              <a:rPr lang="en-US" dirty="0"/>
+              <a:t>["</a:t>
+            </a:r>
+            <a:r>
+              <a:rPr lang="en-US" dirty="0" err="1"/>
+              <a:t>break_conversion_pct</a:t>
+            </a:r>
+            <a:r>
+              <a:rPr lang="en-US" dirty="0"/>
+              <a:t>"] = (</a:t>
+            </a:r>
+            <a:r>
+              <a:rPr lang="en-US" dirty="0" err="1"/>
+              <a:t>total_player_stats</a:t>
+            </a:r>
+            <a:r>
+              <a:rPr lang="en-US" dirty="0"/>
+              <a:t>["</a:t>
+            </a:r>
+            <a:r>
+              <a:rPr lang="en-US" dirty="0" err="1"/>
+              <a:t>break_point_opp_total</a:t>
+            </a:r>
+            <a:r>
+              <a:rPr lang="en-US" dirty="0"/>
+              <a:t>"]-</a:t>
+            </a:r>
+            <a:r>
+              <a:rPr lang="en-US" dirty="0" err="1"/>
+              <a:t>total_player_stats</a:t>
+            </a:r>
+            <a:r>
+              <a:rPr lang="en-US" dirty="0"/>
+              <a:t>["</a:t>
+            </a:r>
+            <a:r>
+              <a:rPr lang="en-US" dirty="0" err="1"/>
+              <a:t>break_point_opp_loss</a:t>
+            </a:r>
+            <a:r>
+              <a:rPr lang="en-US" dirty="0"/>
+              <a:t>"])/</a:t>
+            </a:r>
+            <a:r>
+              <a:rPr lang="en-US" dirty="0" err="1"/>
+              <a:t>total_player_stats</a:t>
+            </a:r>
+            <a:r>
+              <a:rPr lang="en-US" dirty="0"/>
+              <a:t>["</a:t>
+            </a:r>
+            <a:r>
+              <a:rPr lang="en-US" dirty="0" err="1"/>
+              <a:t>break_point_opp_total</a:t>
+            </a:r>
+            <a:r>
+              <a:rPr lang="en-US" dirty="0"/>
+              <a:t>"]</a:t>
+            </a:r>
+          </a:p>
+        </p:txBody>
+      </p:sp>
+    </p:spTree>
+    <p:extLst>
+      <p:ext uri="{BB962C8B-B14F-4D97-AF65-F5344CB8AC3E}">
+        <p14:creationId xmlns:p14="http://schemas.microsoft.com/office/powerpoint/2010/main" val="2367760677"/>
+      </p:ext>
+    </p:extLst>
+  </p:cSld>
+  <p:clrMapOvr>
+    <a:masterClrMapping/>
+  </p:clrMapOvr>
+</p:sld>
+</file>
+
+<file path=ppt/slides/slide14.xml><?xml version="1.0" encoding="utf-8"?>
+<p:sld xmlns:a="http://schemas.openxmlformats.org/drawingml/2006/main" xmlns:r="http://schemas.openxmlformats.org/officeDocument/2006/relationships" xmlns:p="http://schemas.openxmlformats.org/presentationml/2006/main">
+  <p:cSld>
+    <p:spTree>
+      <p:nvGrpSpPr>
+        <p:cNvPr id="1" name=""/>
+        <p:cNvGrpSpPr/>
+        <p:nvPr/>
+      </p:nvGrpSpPr>
+      <p:grpSpPr>
+        <a:xfrm>
+          <a:off x="0" y="0"/>
+          <a:ext cx="0" cy="0"/>
+          <a:chOff x="0" y="0"/>
+          <a:chExt cx="0" cy="0"/>
+        </a:xfrm>
+      </p:grpSpPr>
+      <p:sp>
+        <p:nvSpPr>
+          <p:cNvPr id="2" name="Title 1">
+            <a:extLst>
+              <a:ext uri="{FF2B5EF4-FFF2-40B4-BE49-F238E27FC236}">
+                <a16:creationId xmlns:a16="http://schemas.microsoft.com/office/drawing/2014/main" id="{61A74AC2-8415-409D-A2FC-937305F04A6B}"/>
+              </a:ext>
+            </a:extLst>
+          </p:cNvPr>
+          <p:cNvSpPr>
+            <a:spLocks noGrp="1"/>
+          </p:cNvSpPr>
+          <p:nvPr>
+            <p:ph type="title"/>
+          </p:nvPr>
+        </p:nvSpPr>
+        <p:spPr/>
+        <p:txBody>
+          <a:bodyPr/>
+          <a:lstStyle/>
+          <a:p>
+            <a:pPr algn="ctr"/>
+            <a:r>
+              <a:rPr lang="en-US" dirty="0"/>
+              <a:t>NEW DATAFRAME CREATED WITH ALL PLAYER STATS AND PERCENTAGES</a:t>
+            </a:r>
+          </a:p>
+        </p:txBody>
+      </p:sp>
+      <p:pic>
+        <p:nvPicPr>
+          <p:cNvPr id="4" name="Content Placeholder 3">
+            <a:extLst>
+              <a:ext uri="{FF2B5EF4-FFF2-40B4-BE49-F238E27FC236}">
+                <a16:creationId xmlns:a16="http://schemas.microsoft.com/office/drawing/2014/main" id="{8063FE0F-D4DD-4EE6-88B0-3EBB0F0E31F1}"/>
+              </a:ext>
+            </a:extLst>
+          </p:cNvPr>
+          <p:cNvPicPr>
+            <a:picLocks noGrp="1" noChangeAspect="1"/>
+          </p:cNvPicPr>
+          <p:nvPr>
+            <p:ph idx="1"/>
+          </p:nvPr>
+        </p:nvPicPr>
+        <p:blipFill>
+          <a:blip r:embed="rId2"/>
+          <a:stretch>
+            <a:fillRect/>
+          </a:stretch>
+        </p:blipFill>
+        <p:spPr>
+          <a:xfrm>
+            <a:off x="0" y="2380434"/>
+            <a:ext cx="12192000" cy="4331262"/>
+          </a:xfrm>
+          <a:prstGeom prst="rect">
+            <a:avLst/>
+          </a:prstGeom>
+        </p:spPr>
+      </p:pic>
+    </p:spTree>
+    <p:extLst>
+      <p:ext uri="{BB962C8B-B14F-4D97-AF65-F5344CB8AC3E}">
+        <p14:creationId xmlns:p14="http://schemas.microsoft.com/office/powerpoint/2010/main" val="396596711"/>
+      </p:ext>
+    </p:extLst>
+  </p:cSld>
+  <p:clrMapOvr>
+    <a:masterClrMapping/>
+  </p:clrMapOvr>
+</p:sld>
+</file>
+
 <file path=ppt/slides/slide2.xml><?xml version="1.0" encoding="utf-8"?>
 <p:sld xmlns:a="http://schemas.openxmlformats.org/drawingml/2006/main" xmlns:r="http://schemas.openxmlformats.org/officeDocument/2006/relationships" xmlns:p="http://schemas.openxmlformats.org/presentationml/2006/main">
   <p:cSld>
@@ -5707,6 +6505,104 @@
           <p:cNvPr id="2" name="Title 1">
             <a:extLst>
               <a:ext uri="{FF2B5EF4-FFF2-40B4-BE49-F238E27FC236}">
+                <a16:creationId xmlns:a16="http://schemas.microsoft.com/office/drawing/2014/main" id="{CDC8F0FA-27C4-432A-806A-686786D97958}"/>
+              </a:ext>
+            </a:extLst>
+          </p:cNvPr>
+          <p:cNvSpPr>
+            <a:spLocks noGrp="1"/>
+          </p:cNvSpPr>
+          <p:nvPr>
+            <p:ph type="title"/>
+          </p:nvPr>
+        </p:nvSpPr>
+        <p:spPr/>
+        <p:txBody>
+          <a:bodyPr/>
+          <a:lstStyle/>
+          <a:p>
+            <a:pPr algn="ctr"/>
+            <a:r>
+              <a:rPr lang="en-US" dirty="0"/>
+              <a:t>FUNDAMENTAL QUESTIONS</a:t>
+            </a:r>
+          </a:p>
+        </p:txBody>
+      </p:sp>
+      <p:sp>
+        <p:nvSpPr>
+          <p:cNvPr id="3" name="Content Placeholder 2">
+            <a:extLst>
+              <a:ext uri="{FF2B5EF4-FFF2-40B4-BE49-F238E27FC236}">
+                <a16:creationId xmlns:a16="http://schemas.microsoft.com/office/drawing/2014/main" id="{E0299E7E-A7CB-4F65-A35B-AD9190E8C995}"/>
+              </a:ext>
+            </a:extLst>
+          </p:cNvPr>
+          <p:cNvSpPr>
+            <a:spLocks noGrp="1"/>
+          </p:cNvSpPr>
+          <p:nvPr>
+            <p:ph idx="1"/>
+          </p:nvPr>
+        </p:nvSpPr>
+        <p:spPr/>
+        <p:txBody>
+          <a:bodyPr>
+            <a:normAutofit/>
+          </a:bodyPr>
+          <a:lstStyle/>
+          <a:p>
+            <a:r>
+              <a:rPr lang="en-US" sz="2400" b="1" dirty="0"/>
+              <a:t>CAN WE PREDICT THE WINNER (OUTCOME) OF A TENNIS MATCH WITH MACHINE LEARNING ???</a:t>
+            </a:r>
+          </a:p>
+          <a:p>
+            <a:endParaRPr lang="en-US" sz="2400" b="1" dirty="0"/>
+          </a:p>
+          <a:p>
+            <a:r>
+              <a:rPr lang="en-US" sz="2400" b="1" dirty="0"/>
+              <a:t>WITHIN THE AVAILABLE DATA, WHICH PLAYER STATISTICS SHOULD WE SELECT AS FEATURES (INPUTS) FOR OUR MODEL ???</a:t>
+            </a:r>
+          </a:p>
+        </p:txBody>
+      </p:sp>
+    </p:spTree>
+    <p:extLst>
+      <p:ext uri="{BB962C8B-B14F-4D97-AF65-F5344CB8AC3E}">
+        <p14:creationId xmlns:p14="http://schemas.microsoft.com/office/powerpoint/2010/main" val="4271136183"/>
+      </p:ext>
+    </p:extLst>
+  </p:cSld>
+  <p:clrMapOvr>
+    <a:masterClrMapping/>
+  </p:clrMapOvr>
+</p:sld>
+</file>
+
+<file path=ppt/slides/slide5.xml><?xml version="1.0" encoding="utf-8"?>
+<p:sld xmlns:a="http://schemas.openxmlformats.org/drawingml/2006/main" xmlns:r="http://schemas.openxmlformats.org/officeDocument/2006/relationships" xmlns:p="http://schemas.openxmlformats.org/presentationml/2006/main">
+  <p:cSld>
+    <p:spTree>
+      <p:nvGrpSpPr>
+        <p:cNvPr id="1" name=""/>
+        <p:cNvGrpSpPr/>
+        <p:nvPr/>
+      </p:nvGrpSpPr>
+      <p:grpSpPr>
+        <a:xfrm>
+          <a:off x="0" y="0"/>
+          <a:ext cx="0" cy="0"/>
+          <a:chOff x="0" y="0"/>
+          <a:chExt cx="0" cy="0"/>
+        </a:xfrm>
+      </p:grpSpPr>
+      <p:sp>
+        <p:nvSpPr>
+          <p:cNvPr id="2" name="Title 1">
+            <a:extLst>
+              <a:ext uri="{FF2B5EF4-FFF2-40B4-BE49-F238E27FC236}">
                 <a16:creationId xmlns:a16="http://schemas.microsoft.com/office/drawing/2014/main" id="{D163D831-80B3-49FA-A7D1-4DF30BC49551}"/>
               </a:ext>
             </a:extLst>
@@ -5726,7 +6622,7 @@
             <a:pPr algn="ctr"/>
             <a:r>
               <a:rPr lang="en-US" dirty="0"/>
-              <a:t>DESCRIPTION OF SOURCE DATA</a:t>
+              <a:t>DESCRIPTION OF SOURCE DATA &amp; LOCATION</a:t>
             </a:r>
           </a:p>
         </p:txBody>
@@ -5774,15 +6670,675 @@
           <a:p>
             <a:r>
               <a:rPr lang="en-US" sz="2200" b="1" dirty="0"/>
-              <a:t>CSV FILES USED CAN BE FOUND IN A “TENNIS ATP” GITHUB REPO:     https://github.com/JeffSackmann/tennis_atp</a:t>
-            </a:r>
-          </a:p>
-        </p:txBody>
-      </p:sp>
+              <a:t>CSV FILES USED CAN BE FOUND IN A “TENNIS ATP” GITHUB REPO:     </a:t>
+            </a:r>
+            <a:r>
+              <a:rPr lang="en-US" b="1" dirty="0"/>
+              <a:t>https://github.com/JeffSackmann/tennis_atp</a:t>
+            </a:r>
+          </a:p>
+        </p:txBody>
+      </p:sp>
+      <p:pic>
+        <p:nvPicPr>
+          <p:cNvPr id="4" name="Picture 3">
+            <a:extLst>
+              <a:ext uri="{FF2B5EF4-FFF2-40B4-BE49-F238E27FC236}">
+                <a16:creationId xmlns:a16="http://schemas.microsoft.com/office/drawing/2014/main" id="{E6450FDC-0D7E-44F1-95C2-040F37FB3734}"/>
+              </a:ext>
+            </a:extLst>
+          </p:cNvPr>
+          <p:cNvPicPr>
+            <a:picLocks noChangeAspect="1"/>
+          </p:cNvPicPr>
+          <p:nvPr/>
+        </p:nvPicPr>
+        <p:blipFill>
+          <a:blip r:embed="rId2"/>
+          <a:stretch>
+            <a:fillRect/>
+          </a:stretch>
+        </p:blipFill>
+        <p:spPr>
+          <a:xfrm>
+            <a:off x="6351328" y="4956619"/>
+            <a:ext cx="438150" cy="371475"/>
+          </a:xfrm>
+          <a:prstGeom prst="rect">
+            <a:avLst/>
+          </a:prstGeom>
+        </p:spPr>
+      </p:pic>
+      <p:pic>
+        <p:nvPicPr>
+          <p:cNvPr id="5" name="Picture 4">
+            <a:extLst>
+              <a:ext uri="{FF2B5EF4-FFF2-40B4-BE49-F238E27FC236}">
+                <a16:creationId xmlns:a16="http://schemas.microsoft.com/office/drawing/2014/main" id="{8BAAAD16-D111-45EE-915C-4B2E5F53AB4D}"/>
+              </a:ext>
+            </a:extLst>
+          </p:cNvPr>
+          <p:cNvPicPr>
+            <a:picLocks noChangeAspect="1"/>
+          </p:cNvPicPr>
+          <p:nvPr/>
+        </p:nvPicPr>
+        <p:blipFill>
+          <a:blip r:embed="rId3"/>
+          <a:stretch>
+            <a:fillRect/>
+          </a:stretch>
+        </p:blipFill>
+        <p:spPr>
+          <a:xfrm>
+            <a:off x="132397" y="5328094"/>
+            <a:ext cx="1685925" cy="1476375"/>
+          </a:xfrm>
+          <a:prstGeom prst="rect">
+            <a:avLst/>
+          </a:prstGeom>
+        </p:spPr>
+      </p:pic>
+      <p:pic>
+        <p:nvPicPr>
+          <p:cNvPr id="6" name="Picture 5">
+            <a:extLst>
+              <a:ext uri="{FF2B5EF4-FFF2-40B4-BE49-F238E27FC236}">
+                <a16:creationId xmlns:a16="http://schemas.microsoft.com/office/drawing/2014/main" id="{49E4C521-60AD-47C9-8F4E-FED6735695C6}"/>
+              </a:ext>
+            </a:extLst>
+          </p:cNvPr>
+          <p:cNvPicPr>
+            <a:picLocks noChangeAspect="1"/>
+          </p:cNvPicPr>
+          <p:nvPr/>
+        </p:nvPicPr>
+        <p:blipFill>
+          <a:blip r:embed="rId4"/>
+          <a:stretch>
+            <a:fillRect/>
+          </a:stretch>
+        </p:blipFill>
+        <p:spPr>
+          <a:xfrm>
+            <a:off x="10450946" y="4895850"/>
+            <a:ext cx="1743075" cy="1962150"/>
+          </a:xfrm>
+          <a:prstGeom prst="rect">
+            <a:avLst/>
+          </a:prstGeom>
+        </p:spPr>
+      </p:pic>
+      <p:pic>
+        <p:nvPicPr>
+          <p:cNvPr id="7" name="Picture 6">
+            <a:extLst>
+              <a:ext uri="{FF2B5EF4-FFF2-40B4-BE49-F238E27FC236}">
+                <a16:creationId xmlns:a16="http://schemas.microsoft.com/office/drawing/2014/main" id="{CD4CCFEC-2CAD-45D2-9B32-48E78B62FDF0}"/>
+              </a:ext>
+            </a:extLst>
+          </p:cNvPr>
+          <p:cNvPicPr>
+            <a:picLocks noChangeAspect="1"/>
+          </p:cNvPicPr>
+          <p:nvPr/>
+        </p:nvPicPr>
+        <p:blipFill>
+          <a:blip r:embed="rId5"/>
+          <a:stretch>
+            <a:fillRect/>
+          </a:stretch>
+        </p:blipFill>
+        <p:spPr>
+          <a:xfrm>
+            <a:off x="5708390" y="5299518"/>
+            <a:ext cx="1724025" cy="1533525"/>
+          </a:xfrm>
+          <a:prstGeom prst="rect">
+            <a:avLst/>
+          </a:prstGeom>
+        </p:spPr>
+      </p:pic>
     </p:spTree>
     <p:extLst>
       <p:ext uri="{BB962C8B-B14F-4D97-AF65-F5344CB8AC3E}">
         <p14:creationId xmlns:p14="http://schemas.microsoft.com/office/powerpoint/2010/main" val="2571268079"/>
+      </p:ext>
+    </p:extLst>
+  </p:cSld>
+  <p:clrMapOvr>
+    <a:masterClrMapping/>
+  </p:clrMapOvr>
+</p:sld>
+</file>
+
+<file path=ppt/slides/slide6.xml><?xml version="1.0" encoding="utf-8"?>
+<p:sld xmlns:a="http://schemas.openxmlformats.org/drawingml/2006/main" xmlns:r="http://schemas.openxmlformats.org/officeDocument/2006/relationships" xmlns:p="http://schemas.openxmlformats.org/presentationml/2006/main">
+  <p:cSld>
+    <p:spTree>
+      <p:nvGrpSpPr>
+        <p:cNvPr id="1" name=""/>
+        <p:cNvGrpSpPr/>
+        <p:nvPr/>
+      </p:nvGrpSpPr>
+      <p:grpSpPr>
+        <a:xfrm>
+          <a:off x="0" y="0"/>
+          <a:ext cx="0" cy="0"/>
+          <a:chOff x="0" y="0"/>
+          <a:chExt cx="0" cy="0"/>
+        </a:xfrm>
+      </p:grpSpPr>
+      <p:sp>
+        <p:nvSpPr>
+          <p:cNvPr id="2" name="Title 1">
+            <a:extLst>
+              <a:ext uri="{FF2B5EF4-FFF2-40B4-BE49-F238E27FC236}">
+                <a16:creationId xmlns:a16="http://schemas.microsoft.com/office/drawing/2014/main" id="{83B094FC-4820-4808-AE94-BFB4183B159A}"/>
+              </a:ext>
+            </a:extLst>
+          </p:cNvPr>
+          <p:cNvSpPr>
+            <a:spLocks noGrp="1"/>
+          </p:cNvSpPr>
+          <p:nvPr>
+            <p:ph type="title"/>
+          </p:nvPr>
+        </p:nvSpPr>
+        <p:spPr/>
+        <p:txBody>
+          <a:bodyPr/>
+          <a:lstStyle/>
+          <a:p>
+            <a:pPr algn="ctr"/>
+            <a:r>
+              <a:rPr lang="en-US" dirty="0"/>
+              <a:t>DATA PREPARATION AND SORTING</a:t>
+            </a:r>
+          </a:p>
+        </p:txBody>
+      </p:sp>
+      <p:sp>
+        <p:nvSpPr>
+          <p:cNvPr id="3" name="Content Placeholder 2">
+            <a:extLst>
+              <a:ext uri="{FF2B5EF4-FFF2-40B4-BE49-F238E27FC236}">
+                <a16:creationId xmlns:a16="http://schemas.microsoft.com/office/drawing/2014/main" id="{E469561B-2C72-480E-8DE7-274DB1B38CFE}"/>
+              </a:ext>
+            </a:extLst>
+          </p:cNvPr>
+          <p:cNvSpPr>
+            <a:spLocks noGrp="1"/>
+          </p:cNvSpPr>
+          <p:nvPr>
+            <p:ph idx="1"/>
+          </p:nvPr>
+        </p:nvSpPr>
+        <p:spPr>
+          <a:xfrm>
+            <a:off x="818712" y="2222287"/>
+            <a:ext cx="10554574" cy="3636511"/>
+          </a:xfrm>
+        </p:spPr>
+        <p:txBody>
+          <a:bodyPr>
+            <a:normAutofit/>
+          </a:bodyPr>
+          <a:lstStyle/>
+          <a:p>
+            <a:r>
+              <a:rPr lang="en-US" sz="2000" b="1" dirty="0"/>
+              <a:t>FIRST STEP WAS TO SELECT THE YEARS WE EVENTUALLY WANTED TO TEST AND TRAIN ON:</a:t>
+            </a:r>
+          </a:p>
+          <a:p>
+            <a:r>
+              <a:rPr lang="en-US" sz="2000" b="1" dirty="0"/>
+              <a:t>AFTER SELECTING 2015 &amp; 2016, WE PULLED EACH CSV INTO JUPYTER</a:t>
+            </a:r>
+          </a:p>
+          <a:p>
+            <a:r>
+              <a:rPr lang="en-US" sz="2000" b="1" dirty="0"/>
+              <a:t>THEN SORTED THE PLAYER NAMES, AND CREATED A UNIQUE LIST</a:t>
+            </a:r>
+          </a:p>
+          <a:p>
+            <a:r>
+              <a:rPr lang="en-US" sz="2000" b="1" dirty="0"/>
+              <a:t>NEXT WE SORTED THE PLAYERS BY WINNER AND LOSER</a:t>
+            </a:r>
+          </a:p>
+          <a:p>
+            <a:endParaRPr lang="en-US" sz="2000" b="1" dirty="0"/>
+          </a:p>
+        </p:txBody>
+      </p:sp>
+    </p:spTree>
+    <p:extLst>
+      <p:ext uri="{BB962C8B-B14F-4D97-AF65-F5344CB8AC3E}">
+        <p14:creationId xmlns:p14="http://schemas.microsoft.com/office/powerpoint/2010/main" val="3496967884"/>
+      </p:ext>
+    </p:extLst>
+  </p:cSld>
+  <p:clrMapOvr>
+    <a:masterClrMapping/>
+  </p:clrMapOvr>
+</p:sld>
+</file>
+
+<file path=ppt/slides/slide7.xml><?xml version="1.0" encoding="utf-8"?>
+<p:sld xmlns:a="http://schemas.openxmlformats.org/drawingml/2006/main" xmlns:r="http://schemas.openxmlformats.org/officeDocument/2006/relationships" xmlns:p="http://schemas.openxmlformats.org/presentationml/2006/main">
+  <p:cSld>
+    <p:spTree>
+      <p:nvGrpSpPr>
+        <p:cNvPr id="1" name=""/>
+        <p:cNvGrpSpPr/>
+        <p:nvPr/>
+      </p:nvGrpSpPr>
+      <p:grpSpPr>
+        <a:xfrm>
+          <a:off x="0" y="0"/>
+          <a:ext cx="0" cy="0"/>
+          <a:chOff x="0" y="0"/>
+          <a:chExt cx="0" cy="0"/>
+        </a:xfrm>
+      </p:grpSpPr>
+      <p:sp>
+        <p:nvSpPr>
+          <p:cNvPr id="2" name="Title 1">
+            <a:extLst>
+              <a:ext uri="{FF2B5EF4-FFF2-40B4-BE49-F238E27FC236}">
+                <a16:creationId xmlns:a16="http://schemas.microsoft.com/office/drawing/2014/main" id="{2664D7BA-96EE-42E5-8574-9C7E9A753837}"/>
+              </a:ext>
+            </a:extLst>
+          </p:cNvPr>
+          <p:cNvSpPr>
+            <a:spLocks noGrp="1"/>
+          </p:cNvSpPr>
+          <p:nvPr>
+            <p:ph type="title"/>
+          </p:nvPr>
+        </p:nvSpPr>
+        <p:spPr/>
+        <p:txBody>
+          <a:bodyPr/>
+          <a:lstStyle/>
+          <a:p>
+            <a:pPr algn="ctr"/>
+            <a:r>
+              <a:rPr lang="en-US" dirty="0"/>
+              <a:t>DATA PREPARTION AND SORTING</a:t>
+            </a:r>
+            <a:br>
+              <a:rPr lang="en-US" dirty="0"/>
+            </a:br>
+            <a:endParaRPr lang="en-US" dirty="0"/>
+          </a:p>
+        </p:txBody>
+      </p:sp>
+      <p:sp>
+        <p:nvSpPr>
+          <p:cNvPr id="3" name="Content Placeholder 2">
+            <a:extLst>
+              <a:ext uri="{FF2B5EF4-FFF2-40B4-BE49-F238E27FC236}">
+                <a16:creationId xmlns:a16="http://schemas.microsoft.com/office/drawing/2014/main" id="{29762E8D-4027-4661-8403-8393F67987DE}"/>
+              </a:ext>
+            </a:extLst>
+          </p:cNvPr>
+          <p:cNvSpPr>
+            <a:spLocks noGrp="1"/>
+          </p:cNvSpPr>
+          <p:nvPr>
+            <p:ph idx="1"/>
+          </p:nvPr>
+        </p:nvSpPr>
+        <p:spPr/>
+        <p:txBody>
+          <a:bodyPr>
+            <a:noAutofit/>
+          </a:bodyPr>
+          <a:lstStyle/>
+          <a:p>
+            <a:endParaRPr lang="en-US" b="1" dirty="0"/>
+          </a:p>
+          <a:p>
+            <a:r>
+              <a:rPr lang="en-US" b="1" dirty="0"/>
+              <a:t>WE THEN SELECTED THE FEATURES (INPUTS) TO BE USED IN OUR MODEL, AND SUMMING.  THEY INCLUDE………………………………………….</a:t>
+            </a:r>
+          </a:p>
+          <a:p>
+            <a:r>
+              <a:rPr lang="en-US" b="1" dirty="0"/>
+              <a:t>ACES</a:t>
+            </a:r>
+          </a:p>
+          <a:p>
+            <a:r>
+              <a:rPr lang="en-US" b="1" dirty="0"/>
+              <a:t>SERVICE GAMES</a:t>
+            </a:r>
+          </a:p>
+          <a:p>
+            <a:r>
+              <a:rPr lang="en-US" b="1" dirty="0"/>
+              <a:t>FIRST SERVE IN</a:t>
+            </a:r>
+          </a:p>
+          <a:p>
+            <a:r>
+              <a:rPr lang="en-US" b="1" dirty="0"/>
+              <a:t>FIRST SERVES WON</a:t>
+            </a:r>
+          </a:p>
+          <a:p>
+            <a:r>
+              <a:rPr lang="en-US" b="1" dirty="0"/>
+              <a:t>DOUBLE FAULTS</a:t>
+            </a:r>
+          </a:p>
+          <a:p>
+            <a:r>
+              <a:rPr lang="en-US" b="1" dirty="0"/>
+              <a:t>TOTAL BREAK PTS SAVED</a:t>
+            </a:r>
+          </a:p>
+          <a:p>
+            <a:r>
+              <a:rPr lang="en-US" b="1" dirty="0"/>
+              <a:t>TOTAL BREAK PTS FACED</a:t>
+            </a:r>
+          </a:p>
+          <a:p>
+            <a:r>
+              <a:rPr lang="en-US" b="1" dirty="0"/>
+              <a:t>BREAK POINT OPPONENT TOTAL</a:t>
+            </a:r>
+          </a:p>
+          <a:p>
+            <a:r>
+              <a:rPr lang="en-US" b="1" dirty="0"/>
+              <a:t>BREAK POINT OPPONENT LOSSES</a:t>
+            </a:r>
+          </a:p>
+          <a:p>
+            <a:r>
+              <a:rPr lang="en-US" b="1" dirty="0"/>
+              <a:t>SERVE POINT TOTAL</a:t>
+            </a:r>
+          </a:p>
+        </p:txBody>
+      </p:sp>
+    </p:spTree>
+    <p:extLst>
+      <p:ext uri="{BB962C8B-B14F-4D97-AF65-F5344CB8AC3E}">
+        <p14:creationId xmlns:p14="http://schemas.microsoft.com/office/powerpoint/2010/main" val="2501964641"/>
+      </p:ext>
+    </p:extLst>
+  </p:cSld>
+  <p:clrMapOvr>
+    <a:masterClrMapping/>
+  </p:clrMapOvr>
+</p:sld>
+</file>
+
+<file path=ppt/slides/slide8.xml><?xml version="1.0" encoding="utf-8"?>
+<p:sld xmlns:a="http://schemas.openxmlformats.org/drawingml/2006/main" xmlns:r="http://schemas.openxmlformats.org/officeDocument/2006/relationships" xmlns:p="http://schemas.openxmlformats.org/presentationml/2006/main">
+  <p:cSld>
+    <p:spTree>
+      <p:nvGrpSpPr>
+        <p:cNvPr id="1" name=""/>
+        <p:cNvGrpSpPr/>
+        <p:nvPr/>
+      </p:nvGrpSpPr>
+      <p:grpSpPr>
+        <a:xfrm>
+          <a:off x="0" y="0"/>
+          <a:ext cx="0" cy="0"/>
+          <a:chOff x="0" y="0"/>
+          <a:chExt cx="0" cy="0"/>
+        </a:xfrm>
+      </p:grpSpPr>
+      <p:sp>
+        <p:nvSpPr>
+          <p:cNvPr id="2" name="Title 1">
+            <a:extLst>
+              <a:ext uri="{FF2B5EF4-FFF2-40B4-BE49-F238E27FC236}">
+                <a16:creationId xmlns:a16="http://schemas.microsoft.com/office/drawing/2014/main" id="{10A7F6DB-F8B4-4CF4-81B9-8432CEBFE4D8}"/>
+              </a:ext>
+            </a:extLst>
+          </p:cNvPr>
+          <p:cNvSpPr>
+            <a:spLocks noGrp="1"/>
+          </p:cNvSpPr>
+          <p:nvPr>
+            <p:ph type="title"/>
+          </p:nvPr>
+        </p:nvSpPr>
+        <p:spPr/>
+        <p:txBody>
+          <a:bodyPr/>
+          <a:lstStyle/>
+          <a:p>
+            <a:pPr algn="ctr"/>
+            <a:r>
+              <a:rPr lang="en-US" dirty="0"/>
+              <a:t>DATA PREPARATION AND SORTING</a:t>
+            </a:r>
+          </a:p>
+        </p:txBody>
+      </p:sp>
+      <p:sp>
+        <p:nvSpPr>
+          <p:cNvPr id="3" name="Content Placeholder 2">
+            <a:extLst>
+              <a:ext uri="{FF2B5EF4-FFF2-40B4-BE49-F238E27FC236}">
+                <a16:creationId xmlns:a16="http://schemas.microsoft.com/office/drawing/2014/main" id="{5A46286C-3356-4017-B79B-008BB3C76A08}"/>
+              </a:ext>
+            </a:extLst>
+          </p:cNvPr>
+          <p:cNvSpPr>
+            <a:spLocks noGrp="1"/>
+          </p:cNvSpPr>
+          <p:nvPr>
+            <p:ph idx="1"/>
+          </p:nvPr>
+        </p:nvSpPr>
+        <p:spPr>
+          <a:xfrm>
+            <a:off x="818712" y="3429000"/>
+            <a:ext cx="10554574" cy="2057400"/>
+          </a:xfrm>
+        </p:spPr>
+        <p:txBody>
+          <a:bodyPr>
+            <a:normAutofit/>
+          </a:bodyPr>
+          <a:lstStyle/>
+          <a:p>
+            <a:r>
+              <a:rPr lang="en-US" sz="2000" b="1" dirty="0"/>
+              <a:t>TOOK THE TOTALS FOR ALL THE FEATURES AND GROUPED THEM FOR BOTH THE WINNERS AND THE LOSERS</a:t>
+            </a:r>
+          </a:p>
+          <a:p>
+            <a:endParaRPr lang="en-US" sz="2000" b="1" dirty="0"/>
+          </a:p>
+          <a:p>
+            <a:endParaRPr lang="en-US" sz="2000" b="1" dirty="0"/>
+          </a:p>
+          <a:p>
+            <a:endParaRPr lang="en-US" sz="2000" b="1" dirty="0"/>
+          </a:p>
+          <a:p>
+            <a:endParaRPr lang="en-US" sz="2000" b="1" dirty="0"/>
+          </a:p>
+          <a:p>
+            <a:endParaRPr lang="en-US" sz="2000" b="1" dirty="0"/>
+          </a:p>
+          <a:p>
+            <a:endParaRPr lang="en-US" sz="2000" b="1" dirty="0"/>
+          </a:p>
+          <a:p>
+            <a:endParaRPr lang="en-US" sz="2000" b="1" dirty="0"/>
+          </a:p>
+          <a:p>
+            <a:endParaRPr lang="en-US" sz="2000" b="1" dirty="0"/>
+          </a:p>
+          <a:p>
+            <a:endParaRPr lang="en-US" sz="2000" b="1" dirty="0"/>
+          </a:p>
+        </p:txBody>
+      </p:sp>
+      <p:pic>
+        <p:nvPicPr>
+          <p:cNvPr id="4" name="Picture 3">
+            <a:extLst>
+              <a:ext uri="{FF2B5EF4-FFF2-40B4-BE49-F238E27FC236}">
+                <a16:creationId xmlns:a16="http://schemas.microsoft.com/office/drawing/2014/main" id="{A4E17D26-73F5-433E-B075-FD0EEBC4A5B9}"/>
+              </a:ext>
+            </a:extLst>
+          </p:cNvPr>
+          <p:cNvPicPr>
+            <a:picLocks noChangeAspect="1"/>
+          </p:cNvPicPr>
+          <p:nvPr/>
+        </p:nvPicPr>
+        <p:blipFill>
+          <a:blip r:embed="rId2"/>
+          <a:stretch>
+            <a:fillRect/>
+          </a:stretch>
+        </p:blipFill>
+        <p:spPr>
+          <a:xfrm>
+            <a:off x="1344930" y="3238500"/>
+            <a:ext cx="6972300" cy="2438400"/>
+          </a:xfrm>
+          <a:prstGeom prst="rect">
+            <a:avLst/>
+          </a:prstGeom>
+        </p:spPr>
+      </p:pic>
+    </p:spTree>
+    <p:extLst>
+      <p:ext uri="{BB962C8B-B14F-4D97-AF65-F5344CB8AC3E}">
+        <p14:creationId xmlns:p14="http://schemas.microsoft.com/office/powerpoint/2010/main" val="3582614803"/>
+      </p:ext>
+    </p:extLst>
+  </p:cSld>
+  <p:clrMapOvr>
+    <a:masterClrMapping/>
+  </p:clrMapOvr>
+</p:sld>
+</file>
+
+<file path=ppt/slides/slide9.xml><?xml version="1.0" encoding="utf-8"?>
+<p:sld xmlns:a="http://schemas.openxmlformats.org/drawingml/2006/main" xmlns:r="http://schemas.openxmlformats.org/officeDocument/2006/relationships" xmlns:p="http://schemas.openxmlformats.org/presentationml/2006/main">
+  <p:cSld>
+    <p:spTree>
+      <p:nvGrpSpPr>
+        <p:cNvPr id="1" name=""/>
+        <p:cNvGrpSpPr/>
+        <p:nvPr/>
+      </p:nvGrpSpPr>
+      <p:grpSpPr>
+        <a:xfrm>
+          <a:off x="0" y="0"/>
+          <a:ext cx="0" cy="0"/>
+          <a:chOff x="0" y="0"/>
+          <a:chExt cx="0" cy="0"/>
+        </a:xfrm>
+      </p:grpSpPr>
+      <p:sp>
+        <p:nvSpPr>
+          <p:cNvPr id="2" name="Title 1">
+            <a:extLst>
+              <a:ext uri="{FF2B5EF4-FFF2-40B4-BE49-F238E27FC236}">
+                <a16:creationId xmlns:a16="http://schemas.microsoft.com/office/drawing/2014/main" id="{3C4A6A0E-4508-49EC-9502-B95D799A9D8E}"/>
+              </a:ext>
+            </a:extLst>
+          </p:cNvPr>
+          <p:cNvSpPr>
+            <a:spLocks noGrp="1"/>
+          </p:cNvSpPr>
+          <p:nvPr>
+            <p:ph type="title"/>
+          </p:nvPr>
+        </p:nvSpPr>
+        <p:spPr/>
+        <p:txBody>
+          <a:bodyPr/>
+          <a:lstStyle/>
+          <a:p>
+            <a:pPr algn="ctr"/>
+            <a:r>
+              <a:rPr lang="en-US" dirty="0"/>
+              <a:t>CREATE A DATAFRAME FOR ALL LOSER STATS</a:t>
+            </a:r>
+          </a:p>
+        </p:txBody>
+      </p:sp>
+      <p:sp>
+        <p:nvSpPr>
+          <p:cNvPr id="3" name="Content Placeholder 2">
+            <a:extLst>
+              <a:ext uri="{FF2B5EF4-FFF2-40B4-BE49-F238E27FC236}">
+                <a16:creationId xmlns:a16="http://schemas.microsoft.com/office/drawing/2014/main" id="{1B2BA319-E5FD-453D-8825-79B440FCA6DC}"/>
+              </a:ext>
+            </a:extLst>
+          </p:cNvPr>
+          <p:cNvSpPr>
+            <a:spLocks noGrp="1"/>
+          </p:cNvSpPr>
+          <p:nvPr>
+            <p:ph idx="1"/>
+          </p:nvPr>
+        </p:nvSpPr>
+        <p:spPr/>
+        <p:txBody>
+          <a:bodyPr/>
+          <a:lstStyle/>
+          <a:p>
+            <a:endParaRPr lang="en-US"/>
+          </a:p>
+        </p:txBody>
+      </p:sp>
+      <p:pic>
+        <p:nvPicPr>
+          <p:cNvPr id="4" name="Picture 3">
+            <a:extLst>
+              <a:ext uri="{FF2B5EF4-FFF2-40B4-BE49-F238E27FC236}">
+                <a16:creationId xmlns:a16="http://schemas.microsoft.com/office/drawing/2014/main" id="{CA50EC8E-1AD6-43A4-B18A-99ECEF4DB9C8}"/>
+              </a:ext>
+            </a:extLst>
+          </p:cNvPr>
+          <p:cNvPicPr>
+            <a:picLocks noChangeAspect="1"/>
+          </p:cNvPicPr>
+          <p:nvPr/>
+        </p:nvPicPr>
+        <p:blipFill>
+          <a:blip r:embed="rId2"/>
+          <a:stretch>
+            <a:fillRect/>
+          </a:stretch>
+        </p:blipFill>
+        <p:spPr>
+          <a:xfrm>
+            <a:off x="-1" y="2222287"/>
+            <a:ext cx="12192000" cy="4556701"/>
+          </a:xfrm>
+          <a:prstGeom prst="rect">
+            <a:avLst/>
+          </a:prstGeom>
+        </p:spPr>
+      </p:pic>
+    </p:spTree>
+    <p:extLst>
+      <p:ext uri="{BB962C8B-B14F-4D97-AF65-F5344CB8AC3E}">
+        <p14:creationId xmlns:p14="http://schemas.microsoft.com/office/powerpoint/2010/main" val="821590864"/>
       </p:ext>
     </p:extLst>
   </p:cSld>

</xml_diff>